<commit_message>
poster and report updates
</commit_message>
<xml_diff>
--- a/Poster.pptx
+++ b/Poster.pptx
@@ -4,6 +4,9 @@
   <p:sldMasterIdLst>
     <p:sldMasterId id="2147483648" r:id="rId1"/>
   </p:sldMasterIdLst>
+  <p:notesMasterIdLst>
+    <p:notesMasterId r:id="rId3"/>
+  </p:notesMasterIdLst>
   <p:sldIdLst>
     <p:sldId id="256" r:id="rId2"/>
   </p:sldIdLst>
@@ -105,6 +108,440 @@
     </a:lvl9pPr>
   </p:defaultTextStyle>
 </p:presentation>
+</file>
+
+<file path=ppt/notesMasters/notesMaster1.xml><?xml version="1.0" encoding="utf-8"?>
+<p:notesMaster xmlns:a="http://schemas.openxmlformats.org/drawingml/2006/main" xmlns:r="http://schemas.openxmlformats.org/officeDocument/2006/relationships" xmlns:p="http://schemas.openxmlformats.org/presentationml/2006/main">
+  <p:cSld>
+    <p:bg>
+      <p:bgRef idx="1001">
+        <a:schemeClr val="bg1"/>
+      </p:bgRef>
+    </p:bg>
+    <p:spTree>
+      <p:nvGrpSpPr>
+        <p:cNvPr id="1" name=""/>
+        <p:cNvGrpSpPr/>
+        <p:nvPr/>
+      </p:nvGrpSpPr>
+      <p:grpSpPr>
+        <a:xfrm>
+          <a:off x="0" y="0"/>
+          <a:ext cx="0" cy="0"/>
+          <a:chOff x="0" y="0"/>
+          <a:chExt cx="0" cy="0"/>
+        </a:xfrm>
+      </p:grpSpPr>
+      <p:sp>
+        <p:nvSpPr>
+          <p:cNvPr id="2" name="Header Placeholder 1"/>
+          <p:cNvSpPr>
+            <a:spLocks noGrp="1"/>
+          </p:cNvSpPr>
+          <p:nvPr>
+            <p:ph type="hdr" sz="quarter"/>
+          </p:nvPr>
+        </p:nvSpPr>
+        <p:spPr>
+          <a:xfrm>
+            <a:off x="0" y="0"/>
+            <a:ext cx="2971800" cy="457200"/>
+          </a:xfrm>
+          <a:prstGeom prst="rect">
+            <a:avLst/>
+          </a:prstGeom>
+        </p:spPr>
+        <p:txBody>
+          <a:bodyPr vert="horz" lIns="91440" tIns="45720" rIns="91440" bIns="45720" rtlCol="0"/>
+          <a:lstStyle>
+            <a:lvl1pPr algn="l">
+              <a:defRPr sz="1200"/>
+            </a:lvl1pPr>
+          </a:lstStyle>
+          <a:p>
+            <a:endParaRPr lang="en-US"/>
+          </a:p>
+        </p:txBody>
+      </p:sp>
+      <p:sp>
+        <p:nvSpPr>
+          <p:cNvPr id="3" name="Date Placeholder 2"/>
+          <p:cNvSpPr>
+            <a:spLocks noGrp="1"/>
+          </p:cNvSpPr>
+          <p:nvPr>
+            <p:ph type="dt" idx="1"/>
+          </p:nvPr>
+        </p:nvSpPr>
+        <p:spPr>
+          <a:xfrm>
+            <a:off x="3884613" y="0"/>
+            <a:ext cx="2971800" cy="457200"/>
+          </a:xfrm>
+          <a:prstGeom prst="rect">
+            <a:avLst/>
+          </a:prstGeom>
+        </p:spPr>
+        <p:txBody>
+          <a:bodyPr vert="horz" lIns="91440" tIns="45720" rIns="91440" bIns="45720" rtlCol="0"/>
+          <a:lstStyle>
+            <a:lvl1pPr algn="r">
+              <a:defRPr sz="1200"/>
+            </a:lvl1pPr>
+          </a:lstStyle>
+          <a:p>
+            <a:fld id="{C4DBC66C-495C-4F6B-94AE-0A23986A5164}" type="datetimeFigureOut">
+              <a:rPr lang="en-US" smtClean="0"/>
+              <a:t>12/12/2012</a:t>
+            </a:fld>
+            <a:endParaRPr lang="en-US"/>
+          </a:p>
+        </p:txBody>
+      </p:sp>
+      <p:sp>
+        <p:nvSpPr>
+          <p:cNvPr id="4" name="Slide Image Placeholder 3"/>
+          <p:cNvSpPr>
+            <a:spLocks noGrp="1" noRot="1" noChangeAspect="1"/>
+          </p:cNvSpPr>
+          <p:nvPr>
+            <p:ph type="sldImg" idx="2"/>
+          </p:nvPr>
+        </p:nvSpPr>
+        <p:spPr>
+          <a:xfrm>
+            <a:off x="2143125" y="685800"/>
+            <a:ext cx="2571750" cy="3429000"/>
+          </a:xfrm>
+          <a:prstGeom prst="rect">
+            <a:avLst/>
+          </a:prstGeom>
+          <a:noFill/>
+          <a:ln w="12700">
+            <a:solidFill>
+              <a:prstClr val="black"/>
+            </a:solidFill>
+          </a:ln>
+        </p:spPr>
+        <p:txBody>
+          <a:bodyPr vert="horz" lIns="91440" tIns="45720" rIns="91440" bIns="45720" rtlCol="0" anchor="ctr"/>
+          <a:lstStyle/>
+          <a:p>
+            <a:endParaRPr lang="en-US"/>
+          </a:p>
+        </p:txBody>
+      </p:sp>
+      <p:sp>
+        <p:nvSpPr>
+          <p:cNvPr id="5" name="Notes Placeholder 4"/>
+          <p:cNvSpPr>
+            <a:spLocks noGrp="1"/>
+          </p:cNvSpPr>
+          <p:nvPr>
+            <p:ph type="body" sz="quarter" idx="3"/>
+          </p:nvPr>
+        </p:nvSpPr>
+        <p:spPr>
+          <a:xfrm>
+            <a:off x="685800" y="4343400"/>
+            <a:ext cx="5486400" cy="4114800"/>
+          </a:xfrm>
+          <a:prstGeom prst="rect">
+            <a:avLst/>
+          </a:prstGeom>
+        </p:spPr>
+        <p:txBody>
+          <a:bodyPr vert="horz" lIns="91440" tIns="45720" rIns="91440" bIns="45720" rtlCol="0"/>
+          <a:lstStyle/>
+          <a:p>
+            <a:pPr lvl="0"/>
+            <a:r>
+              <a:rPr lang="en-US" smtClean="0"/>
+              <a:t>Click to edit Master text styles</a:t>
+            </a:r>
+          </a:p>
+          <a:p>
+            <a:pPr lvl="1"/>
+            <a:r>
+              <a:rPr lang="en-US" smtClean="0"/>
+              <a:t>Second level</a:t>
+            </a:r>
+          </a:p>
+          <a:p>
+            <a:pPr lvl="2"/>
+            <a:r>
+              <a:rPr lang="en-US" smtClean="0"/>
+              <a:t>Third level</a:t>
+            </a:r>
+          </a:p>
+          <a:p>
+            <a:pPr lvl="3"/>
+            <a:r>
+              <a:rPr lang="en-US" smtClean="0"/>
+              <a:t>Fourth level</a:t>
+            </a:r>
+          </a:p>
+          <a:p>
+            <a:pPr lvl="4"/>
+            <a:r>
+              <a:rPr lang="en-US" smtClean="0"/>
+              <a:t>Fifth level</a:t>
+            </a:r>
+            <a:endParaRPr lang="en-US"/>
+          </a:p>
+        </p:txBody>
+      </p:sp>
+      <p:sp>
+        <p:nvSpPr>
+          <p:cNvPr id="6" name="Footer Placeholder 5"/>
+          <p:cNvSpPr>
+            <a:spLocks noGrp="1"/>
+          </p:cNvSpPr>
+          <p:nvPr>
+            <p:ph type="ftr" sz="quarter" idx="4"/>
+          </p:nvPr>
+        </p:nvSpPr>
+        <p:spPr>
+          <a:xfrm>
+            <a:off x="0" y="8685213"/>
+            <a:ext cx="2971800" cy="457200"/>
+          </a:xfrm>
+          <a:prstGeom prst="rect">
+            <a:avLst/>
+          </a:prstGeom>
+        </p:spPr>
+        <p:txBody>
+          <a:bodyPr vert="horz" lIns="91440" tIns="45720" rIns="91440" bIns="45720" rtlCol="0" anchor="b"/>
+          <a:lstStyle>
+            <a:lvl1pPr algn="l">
+              <a:defRPr sz="1200"/>
+            </a:lvl1pPr>
+          </a:lstStyle>
+          <a:p>
+            <a:endParaRPr lang="en-US"/>
+          </a:p>
+        </p:txBody>
+      </p:sp>
+      <p:sp>
+        <p:nvSpPr>
+          <p:cNvPr id="7" name="Slide Number Placeholder 6"/>
+          <p:cNvSpPr>
+            <a:spLocks noGrp="1"/>
+          </p:cNvSpPr>
+          <p:nvPr>
+            <p:ph type="sldNum" sz="quarter" idx="5"/>
+          </p:nvPr>
+        </p:nvSpPr>
+        <p:spPr>
+          <a:xfrm>
+            <a:off x="3884613" y="8685213"/>
+            <a:ext cx="2971800" cy="457200"/>
+          </a:xfrm>
+          <a:prstGeom prst="rect">
+            <a:avLst/>
+          </a:prstGeom>
+        </p:spPr>
+        <p:txBody>
+          <a:bodyPr vert="horz" lIns="91440" tIns="45720" rIns="91440" bIns="45720" rtlCol="0" anchor="b"/>
+          <a:lstStyle>
+            <a:lvl1pPr algn="r">
+              <a:defRPr sz="1200"/>
+            </a:lvl1pPr>
+          </a:lstStyle>
+          <a:p>
+            <a:fld id="{6AE55E29-C2AA-4FB9-BF50-EF96DD220E11}" type="slidenum">
+              <a:rPr lang="en-US" smtClean="0"/>
+              <a:t>‹#›</a:t>
+            </a:fld>
+            <a:endParaRPr lang="en-US"/>
+          </a:p>
+        </p:txBody>
+      </p:sp>
+    </p:spTree>
+    <p:extLst>
+      <p:ext uri="{BB962C8B-B14F-4D97-AF65-F5344CB8AC3E}">
+        <p14:creationId xmlns:p14="http://schemas.microsoft.com/office/powerpoint/2010/main" val="626452757"/>
+      </p:ext>
+    </p:extLst>
+  </p:cSld>
+  <p:clrMap bg1="lt1" tx1="dk1" bg2="lt2" tx2="dk2" accent1="accent1" accent2="accent2" accent3="accent3" accent4="accent4" accent5="accent5" accent6="accent6" hlink="hlink" folHlink="folHlink"/>
+  <p:notesStyle>
+    <a:lvl1pPr marL="0" algn="l" defTabSz="914400" rtl="0" eaLnBrk="1" latinLnBrk="0" hangingPunct="1">
+      <a:defRPr sz="1200" kern="1200">
+        <a:solidFill>
+          <a:schemeClr val="tx1"/>
+        </a:solidFill>
+        <a:latin typeface="+mn-lt"/>
+        <a:ea typeface="+mn-ea"/>
+        <a:cs typeface="+mn-cs"/>
+      </a:defRPr>
+    </a:lvl1pPr>
+    <a:lvl2pPr marL="457200" algn="l" defTabSz="914400" rtl="0" eaLnBrk="1" latinLnBrk="0" hangingPunct="1">
+      <a:defRPr sz="1200" kern="1200">
+        <a:solidFill>
+          <a:schemeClr val="tx1"/>
+        </a:solidFill>
+        <a:latin typeface="+mn-lt"/>
+        <a:ea typeface="+mn-ea"/>
+        <a:cs typeface="+mn-cs"/>
+      </a:defRPr>
+    </a:lvl2pPr>
+    <a:lvl3pPr marL="914400" algn="l" defTabSz="914400" rtl="0" eaLnBrk="1" latinLnBrk="0" hangingPunct="1">
+      <a:defRPr sz="1200" kern="1200">
+        <a:solidFill>
+          <a:schemeClr val="tx1"/>
+        </a:solidFill>
+        <a:latin typeface="+mn-lt"/>
+        <a:ea typeface="+mn-ea"/>
+        <a:cs typeface="+mn-cs"/>
+      </a:defRPr>
+    </a:lvl3pPr>
+    <a:lvl4pPr marL="1371600" algn="l" defTabSz="914400" rtl="0" eaLnBrk="1" latinLnBrk="0" hangingPunct="1">
+      <a:defRPr sz="1200" kern="1200">
+        <a:solidFill>
+          <a:schemeClr val="tx1"/>
+        </a:solidFill>
+        <a:latin typeface="+mn-lt"/>
+        <a:ea typeface="+mn-ea"/>
+        <a:cs typeface="+mn-cs"/>
+      </a:defRPr>
+    </a:lvl4pPr>
+    <a:lvl5pPr marL="1828800" algn="l" defTabSz="914400" rtl="0" eaLnBrk="1" latinLnBrk="0" hangingPunct="1">
+      <a:defRPr sz="1200" kern="1200">
+        <a:solidFill>
+          <a:schemeClr val="tx1"/>
+        </a:solidFill>
+        <a:latin typeface="+mn-lt"/>
+        <a:ea typeface="+mn-ea"/>
+        <a:cs typeface="+mn-cs"/>
+      </a:defRPr>
+    </a:lvl5pPr>
+    <a:lvl6pPr marL="2286000" algn="l" defTabSz="914400" rtl="0" eaLnBrk="1" latinLnBrk="0" hangingPunct="1">
+      <a:defRPr sz="1200" kern="1200">
+        <a:solidFill>
+          <a:schemeClr val="tx1"/>
+        </a:solidFill>
+        <a:latin typeface="+mn-lt"/>
+        <a:ea typeface="+mn-ea"/>
+        <a:cs typeface="+mn-cs"/>
+      </a:defRPr>
+    </a:lvl6pPr>
+    <a:lvl7pPr marL="2743200" algn="l" defTabSz="914400" rtl="0" eaLnBrk="1" latinLnBrk="0" hangingPunct="1">
+      <a:defRPr sz="1200" kern="1200">
+        <a:solidFill>
+          <a:schemeClr val="tx1"/>
+        </a:solidFill>
+        <a:latin typeface="+mn-lt"/>
+        <a:ea typeface="+mn-ea"/>
+        <a:cs typeface="+mn-cs"/>
+      </a:defRPr>
+    </a:lvl7pPr>
+    <a:lvl8pPr marL="3200400" algn="l" defTabSz="914400" rtl="0" eaLnBrk="1" latinLnBrk="0" hangingPunct="1">
+      <a:defRPr sz="1200" kern="1200">
+        <a:solidFill>
+          <a:schemeClr val="tx1"/>
+        </a:solidFill>
+        <a:latin typeface="+mn-lt"/>
+        <a:ea typeface="+mn-ea"/>
+        <a:cs typeface="+mn-cs"/>
+      </a:defRPr>
+    </a:lvl8pPr>
+    <a:lvl9pPr marL="3657600" algn="l" defTabSz="914400" rtl="0" eaLnBrk="1" latinLnBrk="0" hangingPunct="1">
+      <a:defRPr sz="1200" kern="1200">
+        <a:solidFill>
+          <a:schemeClr val="tx1"/>
+        </a:solidFill>
+        <a:latin typeface="+mn-lt"/>
+        <a:ea typeface="+mn-ea"/>
+        <a:cs typeface="+mn-cs"/>
+      </a:defRPr>
+    </a:lvl9pPr>
+  </p:notesStyle>
+</p:notesMaster>
+</file>
+
+<file path=ppt/notesSlides/notesSlide1.xml><?xml version="1.0" encoding="utf-8"?>
+<p:notes xmlns:a="http://schemas.openxmlformats.org/drawingml/2006/main" xmlns:r="http://schemas.openxmlformats.org/officeDocument/2006/relationships" xmlns:p="http://schemas.openxmlformats.org/presentationml/2006/main">
+  <p:cSld>
+    <p:spTree>
+      <p:nvGrpSpPr>
+        <p:cNvPr id="1" name=""/>
+        <p:cNvGrpSpPr/>
+        <p:nvPr/>
+      </p:nvGrpSpPr>
+      <p:grpSpPr>
+        <a:xfrm>
+          <a:off x="0" y="0"/>
+          <a:ext cx="0" cy="0"/>
+          <a:chOff x="0" y="0"/>
+          <a:chExt cx="0" cy="0"/>
+        </a:xfrm>
+      </p:grpSpPr>
+      <p:sp>
+        <p:nvSpPr>
+          <p:cNvPr id="2" name="Slide Image Placeholder 1"/>
+          <p:cNvSpPr>
+            <a:spLocks noGrp="1" noRot="1" noChangeAspect="1"/>
+          </p:cNvSpPr>
+          <p:nvPr>
+            <p:ph type="sldImg"/>
+          </p:nvPr>
+        </p:nvSpPr>
+        <p:spPr/>
+      </p:sp>
+      <p:sp>
+        <p:nvSpPr>
+          <p:cNvPr id="3" name="Notes Placeholder 2"/>
+          <p:cNvSpPr>
+            <a:spLocks noGrp="1"/>
+          </p:cNvSpPr>
+          <p:nvPr>
+            <p:ph type="body" idx="1"/>
+          </p:nvPr>
+        </p:nvSpPr>
+        <p:spPr/>
+        <p:txBody>
+          <a:bodyPr/>
+          <a:lstStyle/>
+          <a:p>
+            <a:endParaRPr lang="en-US" dirty="0"/>
+          </a:p>
+        </p:txBody>
+      </p:sp>
+      <p:sp>
+        <p:nvSpPr>
+          <p:cNvPr id="4" name="Slide Number Placeholder 3"/>
+          <p:cNvSpPr>
+            <a:spLocks noGrp="1"/>
+          </p:cNvSpPr>
+          <p:nvPr>
+            <p:ph type="sldNum" sz="quarter" idx="10"/>
+          </p:nvPr>
+        </p:nvSpPr>
+        <p:spPr/>
+        <p:txBody>
+          <a:bodyPr/>
+          <a:lstStyle/>
+          <a:p>
+            <a:fld id="{6AE55E29-C2AA-4FB9-BF50-EF96DD220E11}" type="slidenum">
+              <a:rPr lang="en-US" smtClean="0"/>
+              <a:t>1</a:t>
+            </a:fld>
+            <a:endParaRPr lang="en-US"/>
+          </a:p>
+        </p:txBody>
+      </p:sp>
+    </p:spTree>
+    <p:extLst>
+      <p:ext uri="{BB962C8B-B14F-4D97-AF65-F5344CB8AC3E}">
+        <p14:creationId xmlns:p14="http://schemas.microsoft.com/office/powerpoint/2010/main" val="3773010403"/>
+      </p:ext>
+    </p:extLst>
+  </p:cSld>
+  <p:clrMapOvr>
+    <a:masterClrMapping/>
+  </p:clrMapOvr>
+</p:notes>
 </file>
 
 <file path=ppt/slideLayouts/slideLayout1.xml><?xml version="1.0" encoding="utf-8"?>
@@ -3151,8 +3588,8 @@
         </p:nvSpPr>
         <p:spPr>
           <a:xfrm>
-            <a:off x="0" y="228600"/>
-            <a:ext cx="38404800" cy="4401205"/>
+            <a:off x="1143000" y="228600"/>
+            <a:ext cx="29489400" cy="4401205"/>
           </a:xfrm>
           <a:prstGeom prst="rect">
             <a:avLst/>
@@ -3167,25 +3604,61 @@
           </a:bodyPr>
           <a:lstStyle/>
           <a:p>
-            <a:pPr algn="ctr"/>
             <a:r>
               <a:rPr lang="en-US" sz="14000" dirty="0" smtClean="0">
                 <a:solidFill>
                   <a:srgbClr val="CC0000"/>
                 </a:solidFill>
               </a:rPr>
-              <a:t>STYLOMETRY</a:t>
-            </a:r>
-          </a:p>
-          <a:p>
-            <a:pPr algn="ctr"/>
+              <a:t>STYLOMETRY FOR ONLINE FORUMS</a:t>
+            </a:r>
+            <a:endParaRPr lang="en-US" sz="14000" dirty="0" smtClean="0">
+              <a:solidFill>
+                <a:srgbClr val="CC0000"/>
+              </a:solidFill>
+            </a:endParaRPr>
+          </a:p>
+          <a:p>
+            <a:pPr algn="r"/>
             <a:r>
               <a:rPr lang="en-US" sz="14000" dirty="0" smtClean="0">
                 <a:solidFill>
                   <a:srgbClr val="CC0000"/>
                 </a:solidFill>
               </a:rPr>
-              <a:t>Detecting Authors by writing style</a:t>
+              <a:t>Identifying </a:t>
+            </a:r>
+            <a:r>
+              <a:rPr lang="en-US" sz="14000" dirty="0" smtClean="0">
+                <a:solidFill>
+                  <a:srgbClr val="CC0000"/>
+                </a:solidFill>
+              </a:rPr>
+              <a:t>Authors by </a:t>
+            </a:r>
+            <a:r>
+              <a:rPr lang="en-US" sz="14000" dirty="0" smtClean="0">
+                <a:solidFill>
+                  <a:srgbClr val="CC0000"/>
+                </a:solidFill>
+              </a:rPr>
+              <a:t>Writing </a:t>
+            </a:r>
+            <a:r>
+              <a:rPr lang="en-US" sz="14000" dirty="0">
+                <a:solidFill>
+                  <a:srgbClr val="CC0000"/>
+                </a:solidFill>
+              </a:rPr>
+              <a:t>S</a:t>
+            </a:r>
+            <a:r>
+              <a:rPr lang="en-US" sz="14000" dirty="0" smtClean="0">
+                <a:solidFill>
+                  <a:srgbClr val="CC0000"/>
+                </a:solidFill>
+              </a:rPr>
+              <a:t>tyle</a:t>
             </a:r>
             <a:endParaRPr lang="en-US" sz="14000" dirty="0">
               <a:solidFill>
@@ -3203,7 +3676,7 @@
         </p:nvSpPr>
         <p:spPr>
           <a:xfrm>
-            <a:off x="0" y="30480"/>
+            <a:off x="457200" y="30480"/>
             <a:ext cx="38404800" cy="4617720"/>
           </a:xfrm>
           <a:prstGeom prst="rect">
@@ -3341,54 +3814,126 @@
           </a:p>
         </p:txBody>
       </p:sp>
-      <p:sp>
-        <p:nvSpPr>
-          <p:cNvPr id="12" name="Rectangle 11"/>
-          <p:cNvSpPr/>
-          <p:nvPr/>
-        </p:nvSpPr>
-        <p:spPr>
-          <a:xfrm>
-            <a:off x="0" y="31013400"/>
-            <a:ext cx="38404800" cy="12344400"/>
-          </a:xfrm>
-          <a:prstGeom prst="rect">
-            <a:avLst/>
-          </a:prstGeom>
-          <a:solidFill>
-            <a:schemeClr val="bg1">
-              <a:alpha val="23137"/>
-            </a:schemeClr>
-          </a:solidFill>
-          <a:ln>
-            <a:noFill/>
-          </a:ln>
-        </p:spPr>
-        <p:style>
-          <a:lnRef idx="2">
-            <a:schemeClr val="accent1">
-              <a:shade val="50000"/>
-            </a:schemeClr>
-          </a:lnRef>
-          <a:fillRef idx="1">
-            <a:schemeClr val="accent1"/>
-          </a:fillRef>
-          <a:effectRef idx="0">
-            <a:schemeClr val="accent1"/>
-          </a:effectRef>
-          <a:fontRef idx="minor">
-            <a:schemeClr val="lt1"/>
-          </a:fontRef>
-        </p:style>
-        <p:txBody>
-          <a:bodyPr rtlCol="0" anchor="ctr"/>
-          <a:lstStyle/>
-          <a:p>
-            <a:pPr algn="ctr"/>
-            <a:endParaRPr lang="en-US"/>
-          </a:p>
-        </p:txBody>
-      </p:sp>
+      <mc:AlternateContent xmlns:mc="http://schemas.openxmlformats.org/markup-compatibility/2006">
+        <mc:Choice xmlns:a14="http://schemas.microsoft.com/office/drawing/2010/main" Requires="a14">
+          <p:sp>
+            <p:nvSpPr>
+              <p:cNvPr id="12" name="Rectangle 11"/>
+              <p:cNvSpPr/>
+              <p:nvPr/>
+            </p:nvSpPr>
+            <p:spPr>
+              <a:xfrm>
+                <a:off x="0" y="31013400"/>
+                <a:ext cx="38404800" cy="12344400"/>
+              </a:xfrm>
+              <a:prstGeom prst="rect">
+                <a:avLst/>
+              </a:prstGeom>
+              <a:solidFill>
+                <a:schemeClr val="bg1">
+                  <a:alpha val="23137"/>
+                </a:schemeClr>
+              </a:solidFill>
+              <a:ln>
+                <a:noFill/>
+              </a:ln>
+            </p:spPr>
+            <p:style>
+              <a:lnRef idx="2">
+                <a:schemeClr val="accent1">
+                  <a:shade val="50000"/>
+                </a:schemeClr>
+              </a:lnRef>
+              <a:fillRef idx="1">
+                <a:schemeClr val="accent1"/>
+              </a:fillRef>
+              <a:effectRef idx="0">
+                <a:schemeClr val="accent1"/>
+              </a:effectRef>
+              <a:fontRef idx="minor">
+                <a:schemeClr val="lt1"/>
+              </a:fontRef>
+            </p:style>
+            <p:txBody>
+              <a:bodyPr rtlCol="0" anchor="ctr"/>
+              <a:lstStyle/>
+              <a:p>
+                <a:pPr algn="ctr"/>
+                <a14:m>
+                  <m:oMathPara xmlns:m="http://schemas.openxmlformats.org/officeDocument/2006/math">
+                    <m:oMathParaPr>
+                      <m:jc m:val="centerGroup"/>
+                    </m:oMathParaPr>
+                    <m:oMath xmlns:m="http://schemas.openxmlformats.org/officeDocument/2006/math">
+                      <m:r>
+                        <a:rPr lang="en-US" b="0" i="1" smtClean="0">
+                          <a:latin typeface="Cambria Math"/>
+                        </a:rPr>
+                        <m:t>𝐾</m:t>
+                      </m:r>
+                      <m:r>
+                        <a:rPr lang="en-US" b="0" i="1" smtClean="0">
+                          <a:latin typeface="Cambria Math"/>
+                        </a:rPr>
+                        <m:t>   </m:t>
+                      </m:r>
+                      <m:r>
+                        <a:rPr lang="en-US" b="0" i="1" smtClean="0">
+                          <a:latin typeface="Cambria Math"/>
+                        </a:rPr>
+                        <m:t>𝑎𝑠𝑑𝑓𝑗𝑎𝑠𝑑𝑙𝑓𝑘𝑗𝑎𝑠𝑙𝑑𝑓𝑎𝐾</m:t>
+                      </m:r>
+                    </m:oMath>
+                  </m:oMathPara>
+                </a14:m>
+                <a:endParaRPr lang="en-US" dirty="0"/>
+              </a:p>
+            </p:txBody>
+          </p:sp>
+        </mc:Choice>
+        <mc:Fallback>
+          <p:sp>
+            <p:nvSpPr>
+              <p:cNvPr id="12" name="Rectangle 11"/>
+              <p:cNvSpPr>
+                <a:spLocks noRot="1" noChangeAspect="1" noMove="1" noResize="1" noEditPoints="1" noAdjustHandles="1" noChangeArrowheads="1" noChangeShapeType="1" noTextEdit="1"/>
+              </p:cNvSpPr>
+              <p:nvPr/>
+            </p:nvSpPr>
+            <p:spPr>
+              <a:xfrm>
+                <a:off x="0" y="31013400"/>
+                <a:ext cx="38404800" cy="12344400"/>
+              </a:xfrm>
+              <a:prstGeom prst="rect">
+                <a:avLst/>
+              </a:prstGeom>
+              <a:blipFill rotWithShape="1">
+                <a:blip r:embed="rId3"/>
+                <a:stretch>
+                  <a:fillRect/>
+                </a:stretch>
+              </a:blipFill>
+              <a:ln>
+                <a:noFill/>
+              </a:ln>
+            </p:spPr>
+            <p:txBody>
+              <a:bodyPr/>
+              <a:lstStyle/>
+              <a:p>
+                <a:r>
+                  <a:rPr lang="en-US">
+                    <a:noFill/>
+                  </a:rPr>
+                  <a:t> </a:t>
+                </a:r>
+              </a:p>
+            </p:txBody>
+          </p:sp>
+        </mc:Fallback>
+      </mc:AlternateContent>
       <p:sp>
         <p:nvSpPr>
           <p:cNvPr id="10" name="Rectangle 9"/>
@@ -3503,7 +4048,7 @@
           <p:nvPr/>
         </p:nvPicPr>
         <p:blipFill>
-          <a:blip r:embed="rId2">
+          <a:blip r:embed="rId4">
             <a:extLst>
               <a:ext uri="{28A0092B-C50C-407E-A947-70E740481C1C}">
                 <a14:useLocalDpi xmlns:a14="http://schemas.microsoft.com/office/drawing/2010/main" val="0"/>
@@ -4668,7 +5213,7 @@
           </p:nvSpPr>
           <p:spPr>
             <a:xfrm>
-              <a:off x="31089600" y="26289000"/>
+              <a:off x="31318200" y="26283616"/>
               <a:ext cx="5486400" cy="646331"/>
             </a:xfrm>
             <a:prstGeom prst="rect">
@@ -4682,7 +5227,6 @@
             </a:bodyPr>
             <a:lstStyle/>
             <a:p>
-              <a:pPr algn="ctr"/>
               <a:r>
                 <a:rPr lang="en-US" sz="3600" u="sng" dirty="0" smtClean="0"/>
                 <a:t>Support Vector Machine</a:t>
@@ -4764,7 +5308,7 @@
         </p:nvSpPr>
         <p:spPr>
           <a:xfrm>
-            <a:off x="20916900" y="23088600"/>
+            <a:off x="20231100" y="23079670"/>
             <a:ext cx="7658100" cy="923330"/>
           </a:xfrm>
           <a:prstGeom prst="rect">
@@ -4778,9 +5322,14 @@
           </a:bodyPr>
           <a:lstStyle/>
           <a:p>
+            <a:pPr algn="ctr"/>
             <a:r>
               <a:rPr lang="en-US" sz="5400" dirty="0" smtClean="0"/>
-              <a:t>Optimal Feature Selection</a:t>
+              <a:t>Feature </a:t>
+            </a:r>
+            <a:r>
+              <a:rPr lang="en-US" sz="5400" dirty="0" smtClean="0"/>
+              <a:t>Selection</a:t>
             </a:r>
             <a:endParaRPr lang="en-US" sz="5400" dirty="0"/>
           </a:p>
@@ -4794,7 +5343,7 @@
         </p:nvSpPr>
         <p:spPr>
           <a:xfrm>
-            <a:off x="23088600" y="24003000"/>
+            <a:off x="22174200" y="24042469"/>
             <a:ext cx="3429000" cy="646331"/>
           </a:xfrm>
           <a:prstGeom prst="rect">
@@ -4816,8 +5365,8 @@
           </a:p>
         </p:txBody>
       </p:sp>
-      <mc:AlternateContent xmlns:mc="http://schemas.openxmlformats.org/markup-compatibility/2006" xmlns:a14="http://schemas.microsoft.com/office/drawing/2010/main">
-        <mc:Choice Requires="a14">
+      <mc:AlternateContent xmlns:mc="http://schemas.openxmlformats.org/markup-compatibility/2006">
+        <mc:Choice xmlns:a14="http://schemas.microsoft.com/office/drawing/2010/main" Requires="a14">
           <p:sp>
             <p:nvSpPr>
               <p:cNvPr id="50" name="TextBox 49"/>
@@ -4827,7 +5376,7 @@
             <p:spPr>
               <a:xfrm>
                 <a:off x="22174200" y="24917400"/>
-                <a:ext cx="5486400" cy="4939494"/>
+                <a:ext cx="5486400" cy="5431936"/>
               </a:xfrm>
               <a:prstGeom prst="rect">
                 <a:avLst/>
@@ -4842,8 +5391,9 @@
               <a:p>
                 <a:r>
                   <a:rPr lang="en-US" sz="3200" dirty="0" smtClean="0"/>
-                  <a:t>Determines how much information is gained by the feature if the user is known</a:t>
+                  <a:t>Measures the information acquired by knowing the distribution of a feature among users</a:t>
                 </a:r>
+                <a:endParaRPr lang="en-US" sz="3200" dirty="0" smtClean="0"/>
               </a:p>
               <a:p>
                 <a:endParaRPr lang="en-US" sz="3200" dirty="0"/>
@@ -5138,12 +5688,14 @@
                         <a:rPr lang="en-US" sz="3200" b="0" i="1" smtClean="0">
                           <a:latin typeface="Cambria Math"/>
                         </a:rPr>
-                        <m:t>𝑢𝑠𝑒𝑟</m:t>
+                        <m:t>𝑓𝑒𝑎𝑡𝑢𝑟𝑒</m:t>
                       </m:r>
                     </m:oMath>
                   </m:oMathPara>
                 </a14:m>
-                <a:endParaRPr lang="en-US" sz="3200" b="0" dirty="0" smtClean="0"/>
+                <a:endParaRPr lang="en-US" sz="3200" b="0" i="1" dirty="0" smtClean="0">
+                  <a:latin typeface="Cambria Math"/>
+                </a:endParaRPr>
               </a:p>
               <a:p>
                 <a:pPr/>
@@ -5169,7 +5721,7 @@
                         <a:rPr lang="en-US" sz="3200" b="0" i="1" smtClean="0">
                           <a:latin typeface="Cambria Math"/>
                         </a:rPr>
-                        <m:t>𝑓𝑒𝑎𝑡𝑢𝑟𝑒</m:t>
+                        <m:t>𝑢𝑠𝑒𝑟</m:t>
                       </m:r>
                     </m:oMath>
                   </m:oMathPara>
@@ -5179,7 +5731,7 @@
             </p:txBody>
           </p:sp>
         </mc:Choice>
-        <mc:Fallback xmlns="">
+        <mc:Fallback>
           <p:sp>
             <p:nvSpPr>
               <p:cNvPr id="50" name="TextBox 49"/>
@@ -5191,15 +5743,15 @@
             <p:spPr>
               <a:xfrm>
                 <a:off x="22174200" y="24917400"/>
-                <a:ext cx="5486400" cy="4939494"/>
+                <a:ext cx="5486400" cy="5431936"/>
               </a:xfrm>
               <a:prstGeom prst="rect">
                 <a:avLst/>
               </a:prstGeom>
               <a:blipFill rotWithShape="1">
-                <a:blip r:embed="rId3"/>
+                <a:blip r:embed="rId5"/>
                 <a:stretch>
-                  <a:fillRect l="-2889" t="-1605"/>
+                  <a:fillRect l="-2889" t="-1459" r="-1778"/>
                 </a:stretch>
               </a:blipFill>
             </p:spPr>
@@ -5307,7 +5859,7 @@
           <p:nvPr/>
         </p:nvPicPr>
         <p:blipFill>
-          <a:blip r:embed="rId4">
+          <a:blip r:embed="rId6">
             <a:clrChange>
               <a:clrFrom>
                 <a:srgbClr val="FFFFFF"/>
@@ -5330,7 +5882,7 @@
         </p:blipFill>
         <p:spPr>
           <a:xfrm>
-            <a:off x="16687800" y="32461200"/>
+            <a:off x="15544800" y="32461200"/>
             <a:ext cx="8021954" cy="10515600"/>
           </a:xfrm>
           <a:prstGeom prst="rect">
@@ -5393,11 +5945,7 @@
             </a:r>
             <a:r>
               <a:rPr lang="en-US" sz="4400" dirty="0" smtClean="0"/>
-              <a:t>disputes .  </a:t>
-            </a:r>
-            <a:r>
-              <a:rPr lang="en-US" sz="4400" dirty="0" smtClean="0"/>
-              <a:t>In </a:t>
+              <a:t>disputes .  In </a:t>
             </a:r>
             <a:r>
               <a:rPr lang="en-US" sz="4400" dirty="0"/>
@@ -5405,15 +5953,7 @@
             </a:r>
             <a:r>
               <a:rPr lang="en-US" sz="4400" dirty="0" smtClean="0"/>
-              <a:t>identify </a:t>
-            </a:r>
-            <a:r>
-              <a:rPr lang="en-US" sz="4400" dirty="0" smtClean="0"/>
-              <a:t>bloggers [1,2].  </a:t>
-            </a:r>
-            <a:r>
-              <a:rPr lang="en-US" sz="4400" dirty="0" smtClean="0"/>
-              <a:t>It </a:t>
+              <a:t>identify bloggers [1,2].  It </a:t>
             </a:r>
             <a:r>
               <a:rPr lang="en-US" sz="4400" dirty="0"/>
@@ -5511,7 +6051,7 @@
           <p:nvPr/>
         </p:nvPicPr>
         <p:blipFill>
-          <a:blip r:embed="rId5">
+          <a:blip r:embed="rId7">
             <a:extLst>
               <a:ext uri="{28A0092B-C50C-407E-A947-70E740481C1C}">
                 <a14:useLocalDpi xmlns:a14="http://schemas.microsoft.com/office/drawing/2010/main" val="0"/>
@@ -5524,8 +6064,8 @@
         </p:blipFill>
         <p:spPr>
           <a:xfrm>
-            <a:off x="26289000" y="35890200"/>
-            <a:ext cx="9144000" cy="6891784"/>
+            <a:off x="26289000" y="35661600"/>
+            <a:ext cx="9806889" cy="7391400"/>
           </a:xfrm>
           <a:prstGeom prst="rect">
             <a:avLst/>
@@ -5909,23 +6449,31 @@
           <a:p>
             <a:r>
               <a:rPr lang="en-US" sz="4400" dirty="0" smtClean="0"/>
-              <a:t>The project demonstrates proof-of-concept for </a:t>
+              <a:t>The project </a:t>
+            </a:r>
+            <a:r>
+              <a:rPr lang="en-US" sz="4400" dirty="0" smtClean="0"/>
+              <a:t>successfully demonstrates </a:t>
+            </a:r>
+            <a:r>
+              <a:rPr lang="en-US" sz="4400" dirty="0" smtClean="0"/>
+              <a:t>proof-of-concept </a:t>
             </a:r>
             <a:r>
               <a:rPr lang="en-US" sz="4400" dirty="0" err="1" smtClean="0"/>
-              <a:t>stylometry</a:t>
+              <a:t>stylometric</a:t>
             </a:r>
             <a:r>
               <a:rPr lang="en-US" sz="4400" dirty="0" smtClean="0"/>
-              <a:t> in online forums, where data is often noisy and less abundant than in other written environments.  Our methods are certainly not fully optimized. While it is difficult to imagine significant progress on attributing extremely short posts (e.g., “Welcome to the forum!”), the use of more extensive feature sets may improve accuracy for longer posts.  Examples of promising features include “function word” frequencies </a:t>
+              <a:t> techniques  in </a:t>
             </a:r>
             <a:r>
               <a:rPr lang="en-US" sz="4400" dirty="0" smtClean="0"/>
-              <a:t>[2] and </a:t>
+              <a:t>online forums, where data is often noisy and less abundant than in other written environments.  Our methods are certainly not fully optimized. While it is difficult to imagine significant progress on attributing extremely short posts (e.g., “Welcome to the forum!”), the use of more extensive feature sets may improve accuracy for longer posts.  Examples of promising features include “function word” frequencies [2] and recognition of particular phrases or grammatical constructs preferred by </a:t>
             </a:r>
             <a:r>
               <a:rPr lang="en-US" sz="4400" dirty="0" smtClean="0"/>
-              <a:t>recognition of particular phrases or grammatical constructs preferred by posters</a:t>
+              <a:t>posters.</a:t>
             </a:r>
             <a:endParaRPr lang="en-US" sz="4400" dirty="0"/>
           </a:p>
@@ -5980,12 +6528,12 @@
               <a:t> </a:t>
             </a:r>
             <a:r>
-              <a:rPr lang="en-US" sz="2800" dirty="0" err="1" smtClean="0"/>
-              <a:t>Priacy</a:t>
-            </a:r>
-            <a:r>
               <a:rPr lang="en-US" sz="2800" dirty="0" smtClean="0"/>
-              <a:t> Enhancing Technologies Symposium</a:t>
+              <a:t>Privacy </a:t>
+            </a:r>
+            <a:r>
+              <a:rPr lang="en-US" sz="2800" dirty="0" smtClean="0"/>
+              <a:t>Enhancing Technologies Symposium</a:t>
             </a:r>
           </a:p>
           <a:p>
@@ -6010,6 +6558,275 @@
           </a:p>
         </p:txBody>
       </p:sp>
+      <p:sp>
+        <p:nvSpPr>
+          <p:cNvPr id="33" name="TextBox 32"/>
+          <p:cNvSpPr txBox="1"/>
+          <p:nvPr/>
+        </p:nvSpPr>
+        <p:spPr>
+          <a:xfrm>
+            <a:off x="30718125" y="320457"/>
+            <a:ext cx="7086600" cy="3108543"/>
+          </a:xfrm>
+          <a:prstGeom prst="rect">
+            <a:avLst/>
+          </a:prstGeom>
+          <a:noFill/>
+        </p:spPr>
+        <p:txBody>
+          <a:bodyPr wrap="square" rtlCol="0" anchor="ctr">
+            <a:spAutoFit/>
+          </a:bodyPr>
+          <a:lstStyle/>
+          <a:p>
+            <a:pPr algn="ctr"/>
+            <a:r>
+              <a:rPr lang="en-US" sz="8000" b="1" dirty="0" smtClean="0">
+                <a:solidFill>
+                  <a:schemeClr val="accent1">
+                    <a:lumMod val="75000"/>
+                  </a:schemeClr>
+                </a:solidFill>
+              </a:rPr>
+              <a:t>Kurt Barry</a:t>
+            </a:r>
+          </a:p>
+          <a:p>
+            <a:pPr algn="ctr"/>
+            <a:r>
+              <a:rPr lang="en-US" sz="8000" b="1" dirty="0" smtClean="0">
+                <a:solidFill>
+                  <a:schemeClr val="accent1">
+                    <a:lumMod val="75000"/>
+                  </a:schemeClr>
+                </a:solidFill>
+              </a:rPr>
+              <a:t>Katherine Luna</a:t>
+            </a:r>
+          </a:p>
+          <a:p>
+            <a:endParaRPr lang="en-US" sz="3600" dirty="0"/>
+          </a:p>
+        </p:txBody>
+      </p:sp>
+      <mc:AlternateContent xmlns:mc="http://schemas.openxmlformats.org/markup-compatibility/2006">
+        <mc:Choice xmlns:a14="http://schemas.microsoft.com/office/drawing/2010/main" Requires="a14">
+          <p:sp>
+            <p:nvSpPr>
+              <p:cNvPr id="34" name="TextBox 33"/>
+              <p:cNvSpPr txBox="1"/>
+              <p:nvPr/>
+            </p:nvSpPr>
+            <p:spPr>
+              <a:xfrm>
+                <a:off x="26517600" y="36774831"/>
+                <a:ext cx="4114800" cy="944169"/>
+              </a:xfrm>
+              <a:prstGeom prst="rect">
+                <a:avLst/>
+              </a:prstGeom>
+              <a:solidFill>
+                <a:schemeClr val="bg1"/>
+              </a:solidFill>
+              <a:ln>
+                <a:solidFill>
+                  <a:schemeClr val="tx1"/>
+                </a:solidFill>
+              </a:ln>
+            </p:spPr>
+            <p:txBody>
+              <a:bodyPr wrap="square" rtlCol="0">
+                <a:spAutoFit/>
+              </a:bodyPr>
+              <a:lstStyle/>
+              <a:p>
+                <a14:m>
+                  <m:oMathPara xmlns:m="http://schemas.openxmlformats.org/officeDocument/2006/math">
+                    <m:oMathParaPr>
+                      <m:jc m:val="centerGroup"/>
+                    </m:oMathParaPr>
+                    <m:oMath xmlns:m="http://schemas.openxmlformats.org/officeDocument/2006/math">
+                      <m:r>
+                        <a:rPr lang="en-US" sz="2800" b="0" i="1" smtClean="0">
+                          <a:latin typeface="Cambria Math"/>
+                        </a:rPr>
+                        <m:t>𝐾</m:t>
+                      </m:r>
+                      <m:d>
+                        <m:dPr>
+                          <m:ctrlPr>
+                            <a:rPr lang="en-US" sz="2800" b="0" i="1" smtClean="0">
+                              <a:latin typeface="Cambria Math"/>
+                            </a:rPr>
+                          </m:ctrlPr>
+                        </m:dPr>
+                        <m:e>
+                          <m:r>
+                            <a:rPr lang="en-US" sz="2800" b="0" i="1" smtClean="0">
+                              <a:latin typeface="Cambria Math"/>
+                            </a:rPr>
+                            <m:t>𝑥</m:t>
+                          </m:r>
+                          <m:r>
+                            <a:rPr lang="en-US" sz="2800" b="0" i="1" smtClean="0">
+                              <a:latin typeface="Cambria Math"/>
+                            </a:rPr>
+                            <m:t>,</m:t>
+                          </m:r>
+                          <m:sSup>
+                            <m:sSupPr>
+                              <m:ctrlPr>
+                                <a:rPr lang="en-US" sz="2800" b="0" i="1" smtClean="0">
+                                  <a:latin typeface="Cambria Math"/>
+                                </a:rPr>
+                              </m:ctrlPr>
+                            </m:sSupPr>
+                            <m:e>
+                              <m:r>
+                                <a:rPr lang="en-US" sz="2800" b="0" i="1" smtClean="0">
+                                  <a:latin typeface="Cambria Math"/>
+                                </a:rPr>
+                                <m:t>𝑥</m:t>
+                              </m:r>
+                            </m:e>
+                            <m:sup>
+                              <m:r>
+                                <a:rPr lang="en-US" sz="2800" b="0" i="1" smtClean="0">
+                                  <a:latin typeface="Cambria Math"/>
+                                </a:rPr>
+                                <m:t>′</m:t>
+                              </m:r>
+                            </m:sup>
+                          </m:sSup>
+                        </m:e>
+                      </m:d>
+                      <m:r>
+                        <a:rPr lang="en-US" sz="2800" b="0" i="1" smtClean="0">
+                          <a:latin typeface="Cambria Math"/>
+                        </a:rPr>
+                        <m:t>=</m:t>
+                      </m:r>
+                      <m:sSup>
+                        <m:sSupPr>
+                          <m:ctrlPr>
+                            <a:rPr lang="en-US" sz="2800" b="0" i="1" smtClean="0">
+                              <a:latin typeface="Cambria Math"/>
+                            </a:rPr>
+                          </m:ctrlPr>
+                        </m:sSupPr>
+                        <m:e>
+                          <m:r>
+                            <a:rPr lang="en-US" sz="2800" i="1">
+                              <a:latin typeface="Cambria Math"/>
+                            </a:rPr>
+                            <m:t>(0.5</m:t>
+                          </m:r>
+                          <m:d>
+                            <m:dPr>
+                              <m:begChr m:val="⟨"/>
+                              <m:endChr m:val="⟩"/>
+                              <m:ctrlPr>
+                                <a:rPr lang="en-US" sz="2800" i="1" smtClean="0">
+                                  <a:latin typeface="Cambria Math"/>
+                                </a:rPr>
+                              </m:ctrlPr>
+                            </m:dPr>
+                            <m:e>
+                              <m:r>
+                                <a:rPr lang="en-US" sz="2800" b="0" i="1" smtClean="0">
+                                  <a:latin typeface="Cambria Math"/>
+                                </a:rPr>
+                                <m:t>𝑥</m:t>
+                              </m:r>
+                              <m:r>
+                                <a:rPr lang="en-US" sz="2800" b="0" i="1" smtClean="0">
+                                  <a:latin typeface="Cambria Math"/>
+                                </a:rPr>
+                                <m:t>,</m:t>
+                              </m:r>
+                              <m:r>
+                                <a:rPr lang="en-US" sz="2800" b="0" i="1" smtClean="0">
+                                  <a:latin typeface="Cambria Math"/>
+                                </a:rPr>
+                                <m:t>𝑥</m:t>
+                              </m:r>
+                              <m:r>
+                                <a:rPr lang="en-US" sz="2800" b="0" i="1" smtClean="0">
+                                  <a:latin typeface="Cambria Math"/>
+                                </a:rPr>
+                                <m:t>′</m:t>
+                              </m:r>
+                            </m:e>
+                          </m:d>
+                          <m:r>
+                            <a:rPr lang="en-US" sz="2800" i="1">
+                              <a:latin typeface="Cambria Math"/>
+                            </a:rPr>
+                            <m:t>+9)</m:t>
+                          </m:r>
+                        </m:e>
+                        <m:sup>
+                          <m:r>
+                            <a:rPr lang="en-US" sz="2800" b="0" i="1" smtClean="0">
+                              <a:latin typeface="Cambria Math"/>
+                            </a:rPr>
+                            <m:t>2</m:t>
+                          </m:r>
+                        </m:sup>
+                      </m:sSup>
+                    </m:oMath>
+                  </m:oMathPara>
+                </a14:m>
+                <a:endParaRPr lang="en-US" sz="2800" dirty="0"/>
+              </a:p>
+            </p:txBody>
+          </p:sp>
+        </mc:Choice>
+        <mc:Fallback>
+          <p:sp>
+            <p:nvSpPr>
+              <p:cNvPr id="34" name="TextBox 33"/>
+              <p:cNvSpPr txBox="1">
+                <a:spLocks noRot="1" noChangeAspect="1" noMove="1" noResize="1" noEditPoints="1" noAdjustHandles="1" noChangeArrowheads="1" noChangeShapeType="1" noTextEdit="1"/>
+              </p:cNvSpPr>
+              <p:nvPr/>
+            </p:nvSpPr>
+            <p:spPr>
+              <a:xfrm>
+                <a:off x="26517600" y="36774831"/>
+                <a:ext cx="4114800" cy="944169"/>
+              </a:xfrm>
+              <a:prstGeom prst="rect">
+                <a:avLst/>
+              </a:prstGeom>
+              <a:blipFill rotWithShape="1">
+                <a:blip r:embed="rId8"/>
+                <a:stretch>
+                  <a:fillRect/>
+                </a:stretch>
+              </a:blipFill>
+              <a:ln>
+                <a:solidFill>
+                  <a:schemeClr val="tx1"/>
+                </a:solidFill>
+              </a:ln>
+            </p:spPr>
+            <p:txBody>
+              <a:bodyPr/>
+              <a:lstStyle/>
+              <a:p>
+                <a:r>
+                  <a:rPr lang="en-US">
+                    <a:noFill/>
+                  </a:rPr>
+                  <a:t> </a:t>
+                </a:r>
+              </a:p>
+            </p:txBody>
+          </p:sp>
+        </mc:Fallback>
+      </mc:AlternateContent>
     </p:spTree>
     <p:extLst>
       <p:ext uri="{BB962C8B-B14F-4D97-AF65-F5344CB8AC3E}">
@@ -6313,4 +7130,289 @@
   <a:objectDefaults/>
   <a:extraClrSchemeLst/>
 </a:theme>
+</file>
+
+<file path=ppt/theme/theme2.xml><?xml version="1.0" encoding="utf-8"?>
+<a:theme xmlns:a="http://schemas.openxmlformats.org/drawingml/2006/main" name="Office Theme">
+  <a:themeElements>
+    <a:clrScheme name="Office">
+      <a:dk1>
+        <a:sysClr val="windowText" lastClr="000000"/>
+      </a:dk1>
+      <a:lt1>
+        <a:sysClr val="window" lastClr="FFFFFF"/>
+      </a:lt1>
+      <a:dk2>
+        <a:srgbClr val="1F497D"/>
+      </a:dk2>
+      <a:lt2>
+        <a:srgbClr val="EEECE1"/>
+      </a:lt2>
+      <a:accent1>
+        <a:srgbClr val="4F81BD"/>
+      </a:accent1>
+      <a:accent2>
+        <a:srgbClr val="C0504D"/>
+      </a:accent2>
+      <a:accent3>
+        <a:srgbClr val="9BBB59"/>
+      </a:accent3>
+      <a:accent4>
+        <a:srgbClr val="8064A2"/>
+      </a:accent4>
+      <a:accent5>
+        <a:srgbClr val="4BACC6"/>
+      </a:accent5>
+      <a:accent6>
+        <a:srgbClr val="F79646"/>
+      </a:accent6>
+      <a:hlink>
+        <a:srgbClr val="0000FF"/>
+      </a:hlink>
+      <a:folHlink>
+        <a:srgbClr val="800080"/>
+      </a:folHlink>
+    </a:clrScheme>
+    <a:fontScheme name="Office">
+      <a:majorFont>
+        <a:latin typeface="Calibri"/>
+        <a:ea typeface=""/>
+        <a:cs typeface=""/>
+        <a:font script="Jpan" typeface="ＭＳ Ｐゴシック"/>
+        <a:font script="Hang" typeface="맑은 고딕"/>
+        <a:font script="Hans" typeface="宋体"/>
+        <a:font script="Hant" typeface="新細明體"/>
+        <a:font script="Arab" typeface="Times New Roman"/>
+        <a:font script="Hebr" typeface="Times New Roman"/>
+        <a:font script="Thai" typeface="Angsana New"/>
+        <a:font script="Ethi" typeface="Nyala"/>
+        <a:font script="Beng" typeface="Vrinda"/>
+        <a:font script="Gujr" typeface="Shruti"/>
+        <a:font script="Khmr" typeface="MoolBoran"/>
+        <a:font script="Knda" typeface="Tunga"/>
+        <a:font script="Guru" typeface="Raavi"/>
+        <a:font script="Cans" typeface="Euphemia"/>
+        <a:font script="Cher" typeface="Plantagenet Cherokee"/>
+        <a:font script="Yiii" typeface="Microsoft Yi Baiti"/>
+        <a:font script="Tibt" typeface="Microsoft Himalaya"/>
+        <a:font script="Thaa" typeface="MV Boli"/>
+        <a:font script="Deva" typeface="Mangal"/>
+        <a:font script="Telu" typeface="Gautami"/>
+        <a:font script="Taml" typeface="Latha"/>
+        <a:font script="Syrc" typeface="Estrangelo Edessa"/>
+        <a:font script="Orya" typeface="Kalinga"/>
+        <a:font script="Mlym" typeface="Kartika"/>
+        <a:font script="Laoo" typeface="DokChampa"/>
+        <a:font script="Sinh" typeface="Iskoola Pota"/>
+        <a:font script="Mong" typeface="Mongolian Baiti"/>
+        <a:font script="Viet" typeface="Times New Roman"/>
+        <a:font script="Uigh" typeface="Microsoft Uighur"/>
+        <a:font script="Geor" typeface="Sylfaen"/>
+      </a:majorFont>
+      <a:minorFont>
+        <a:latin typeface="Calibri"/>
+        <a:ea typeface=""/>
+        <a:cs typeface=""/>
+        <a:font script="Jpan" typeface="ＭＳ Ｐゴシック"/>
+        <a:font script="Hang" typeface="맑은 고딕"/>
+        <a:font script="Hans" typeface="宋体"/>
+        <a:font script="Hant" typeface="新細明體"/>
+        <a:font script="Arab" typeface="Arial"/>
+        <a:font script="Hebr" typeface="Arial"/>
+        <a:font script="Thai" typeface="Cordia New"/>
+        <a:font script="Ethi" typeface="Nyala"/>
+        <a:font script="Beng" typeface="Vrinda"/>
+        <a:font script="Gujr" typeface="Shruti"/>
+        <a:font script="Khmr" typeface="DaunPenh"/>
+        <a:font script="Knda" typeface="Tunga"/>
+        <a:font script="Guru" typeface="Raavi"/>
+        <a:font script="Cans" typeface="Euphemia"/>
+        <a:font script="Cher" typeface="Plantagenet Cherokee"/>
+        <a:font script="Yiii" typeface="Microsoft Yi Baiti"/>
+        <a:font script="Tibt" typeface="Microsoft Himalaya"/>
+        <a:font script="Thaa" typeface="MV Boli"/>
+        <a:font script="Deva" typeface="Mangal"/>
+        <a:font script="Telu" typeface="Gautami"/>
+        <a:font script="Taml" typeface="Latha"/>
+        <a:font script="Syrc" typeface="Estrangelo Edessa"/>
+        <a:font script="Orya" typeface="Kalinga"/>
+        <a:font script="Mlym" typeface="Kartika"/>
+        <a:font script="Laoo" typeface="DokChampa"/>
+        <a:font script="Sinh" typeface="Iskoola Pota"/>
+        <a:font script="Mong" typeface="Mongolian Baiti"/>
+        <a:font script="Viet" typeface="Arial"/>
+        <a:font script="Uigh" typeface="Microsoft Uighur"/>
+        <a:font script="Geor" typeface="Sylfaen"/>
+      </a:minorFont>
+    </a:fontScheme>
+    <a:fmtScheme name="Office">
+      <a:fillStyleLst>
+        <a:solidFill>
+          <a:schemeClr val="phClr"/>
+        </a:solidFill>
+        <a:gradFill rotWithShape="1">
+          <a:gsLst>
+            <a:gs pos="0">
+              <a:schemeClr val="phClr">
+                <a:tint val="50000"/>
+                <a:satMod val="300000"/>
+              </a:schemeClr>
+            </a:gs>
+            <a:gs pos="35000">
+              <a:schemeClr val="phClr">
+                <a:tint val="37000"/>
+                <a:satMod val="300000"/>
+              </a:schemeClr>
+            </a:gs>
+            <a:gs pos="100000">
+              <a:schemeClr val="phClr">
+                <a:tint val="15000"/>
+                <a:satMod val="350000"/>
+              </a:schemeClr>
+            </a:gs>
+          </a:gsLst>
+          <a:lin ang="16200000" scaled="1"/>
+        </a:gradFill>
+        <a:gradFill rotWithShape="1">
+          <a:gsLst>
+            <a:gs pos="0">
+              <a:schemeClr val="phClr">
+                <a:shade val="51000"/>
+                <a:satMod val="130000"/>
+              </a:schemeClr>
+            </a:gs>
+            <a:gs pos="80000">
+              <a:schemeClr val="phClr">
+                <a:shade val="93000"/>
+                <a:satMod val="130000"/>
+              </a:schemeClr>
+            </a:gs>
+            <a:gs pos="100000">
+              <a:schemeClr val="phClr">
+                <a:shade val="94000"/>
+                <a:satMod val="135000"/>
+              </a:schemeClr>
+            </a:gs>
+          </a:gsLst>
+          <a:lin ang="16200000" scaled="0"/>
+        </a:gradFill>
+      </a:fillStyleLst>
+      <a:lnStyleLst>
+        <a:ln w="9525" cap="flat" cmpd="sng" algn="ctr">
+          <a:solidFill>
+            <a:schemeClr val="phClr">
+              <a:shade val="95000"/>
+              <a:satMod val="105000"/>
+            </a:schemeClr>
+          </a:solidFill>
+          <a:prstDash val="solid"/>
+        </a:ln>
+        <a:ln w="25400" cap="flat" cmpd="sng" algn="ctr">
+          <a:solidFill>
+            <a:schemeClr val="phClr"/>
+          </a:solidFill>
+          <a:prstDash val="solid"/>
+        </a:ln>
+        <a:ln w="38100" cap="flat" cmpd="sng" algn="ctr">
+          <a:solidFill>
+            <a:schemeClr val="phClr"/>
+          </a:solidFill>
+          <a:prstDash val="solid"/>
+        </a:ln>
+      </a:lnStyleLst>
+      <a:effectStyleLst>
+        <a:effectStyle>
+          <a:effectLst>
+            <a:outerShdw blurRad="40000" dist="20000" dir="5400000" rotWithShape="0">
+              <a:srgbClr val="000000">
+                <a:alpha val="38000"/>
+              </a:srgbClr>
+            </a:outerShdw>
+          </a:effectLst>
+        </a:effectStyle>
+        <a:effectStyle>
+          <a:effectLst>
+            <a:outerShdw blurRad="40000" dist="23000" dir="5400000" rotWithShape="0">
+              <a:srgbClr val="000000">
+                <a:alpha val="35000"/>
+              </a:srgbClr>
+            </a:outerShdw>
+          </a:effectLst>
+        </a:effectStyle>
+        <a:effectStyle>
+          <a:effectLst>
+            <a:outerShdw blurRad="40000" dist="23000" dir="5400000" rotWithShape="0">
+              <a:srgbClr val="000000">
+                <a:alpha val="35000"/>
+              </a:srgbClr>
+            </a:outerShdw>
+          </a:effectLst>
+          <a:scene3d>
+            <a:camera prst="orthographicFront">
+              <a:rot lat="0" lon="0" rev="0"/>
+            </a:camera>
+            <a:lightRig rig="threePt" dir="t">
+              <a:rot lat="0" lon="0" rev="1200000"/>
+            </a:lightRig>
+          </a:scene3d>
+          <a:sp3d>
+            <a:bevelT w="63500" h="25400"/>
+          </a:sp3d>
+        </a:effectStyle>
+      </a:effectStyleLst>
+      <a:bgFillStyleLst>
+        <a:solidFill>
+          <a:schemeClr val="phClr"/>
+        </a:solidFill>
+        <a:gradFill rotWithShape="1">
+          <a:gsLst>
+            <a:gs pos="0">
+              <a:schemeClr val="phClr">
+                <a:tint val="40000"/>
+                <a:satMod val="350000"/>
+              </a:schemeClr>
+            </a:gs>
+            <a:gs pos="40000">
+              <a:schemeClr val="phClr">
+                <a:tint val="45000"/>
+                <a:shade val="99000"/>
+                <a:satMod val="350000"/>
+              </a:schemeClr>
+            </a:gs>
+            <a:gs pos="100000">
+              <a:schemeClr val="phClr">
+                <a:shade val="20000"/>
+                <a:satMod val="255000"/>
+              </a:schemeClr>
+            </a:gs>
+          </a:gsLst>
+          <a:path path="circle">
+            <a:fillToRect l="50000" t="-80000" r="50000" b="180000"/>
+          </a:path>
+        </a:gradFill>
+        <a:gradFill rotWithShape="1">
+          <a:gsLst>
+            <a:gs pos="0">
+              <a:schemeClr val="phClr">
+                <a:tint val="80000"/>
+                <a:satMod val="300000"/>
+              </a:schemeClr>
+            </a:gs>
+            <a:gs pos="100000">
+              <a:schemeClr val="phClr">
+                <a:shade val="30000"/>
+                <a:satMod val="200000"/>
+              </a:schemeClr>
+            </a:gs>
+          </a:gsLst>
+          <a:path path="circle">
+            <a:fillToRect l="50000" t="50000" r="50000" b="50000"/>
+          </a:path>
+        </a:gradFill>
+      </a:bgFillStyleLst>
+    </a:fmtScheme>
+  </a:themeElements>
+  <a:objectDefaults/>
+  <a:extraClrSchemeLst/>
+</a:theme>
 </file>
</xml_diff>